<commit_message>
Update dependencies and styles
</commit_message>
<xml_diff>
--- a/devtools/design/icon-design.pptx
+++ b/devtools/design/icon-design.pptx
@@ -6779,7 +6779,7 @@
         </p:nvSpPr>
         <p:spPr>
           <a:xfrm>
-            <a:off x="560705" y="4257040"/>
+            <a:off x="549275" y="4244975"/>
             <a:ext cx="4986655" cy="1564640"/>
           </a:xfrm>
           <a:prstGeom prst="rect">
@@ -6788,10 +6788,10 @@
           <a:gradFill>
             <a:gsLst>
               <a:gs pos="0">
-                <a:srgbClr val="F43F5E"/>
+                <a:srgbClr val="D6A702"/>
               </a:gs>
               <a:gs pos="100000">
-                <a:srgbClr val="9F1239"/>
+                <a:srgbClr val="854D0E"/>
               </a:gs>
             </a:gsLst>
             <a:lin ang="5400000" scaled="0"/>

</xml_diff>